<commit_message>
Actualizacion de la presentacion
Actualizacion de las abreviaciones de los nombres
</commit_message>
<xml_diff>
--- a/Monitoreo y Control.pptx
+++ b/Monitoreo y Control.pptx
@@ -365,7 +365,7 @@
           <a:p>
             <a:fld id="{09A7EB5C-7C07-7646-925E-9C5C7B4A0A1C}" type="slidenum">
               <a:rPr lang="es-ES_tradnl" smtClean="0"/>
-              <a:t>‹#›</a:t>
+              <a:t>‹Nº›</a:t>
             </a:fld>
             <a:endParaRPr lang="es-ES_tradnl"/>
           </a:p>
@@ -831,7 +831,7 @@
           <a:p>
             <a:fld id="{90361390-4E53-E84E-AD55-1B7C77486D52}" type="slidenum">
               <a:rPr lang="es-ES_tradnl" smtClean="0"/>
-              <a:t>‹#›</a:t>
+              <a:t>‹Nº›</a:t>
             </a:fld>
             <a:endParaRPr lang="es-ES_tradnl"/>
           </a:p>
@@ -1001,7 +1001,7 @@
           <a:p>
             <a:fld id="{90361390-4E53-E84E-AD55-1B7C77486D52}" type="slidenum">
               <a:rPr lang="es-ES_tradnl" smtClean="0"/>
-              <a:t>‹#›</a:t>
+              <a:t>‹Nº›</a:t>
             </a:fld>
             <a:endParaRPr lang="es-ES_tradnl"/>
           </a:p>
@@ -1181,7 +1181,7 @@
           <a:p>
             <a:fld id="{90361390-4E53-E84E-AD55-1B7C77486D52}" type="slidenum">
               <a:rPr lang="es-ES_tradnl" smtClean="0"/>
-              <a:t>‹#›</a:t>
+              <a:t>‹Nº›</a:t>
             </a:fld>
             <a:endParaRPr lang="es-ES_tradnl"/>
           </a:p>
@@ -1351,7 +1351,7 @@
           <a:p>
             <a:fld id="{90361390-4E53-E84E-AD55-1B7C77486D52}" type="slidenum">
               <a:rPr lang="es-ES_tradnl" smtClean="0"/>
-              <a:t>‹#›</a:t>
+              <a:t>‹Nº›</a:t>
             </a:fld>
             <a:endParaRPr lang="es-ES_tradnl"/>
           </a:p>
@@ -1597,7 +1597,7 @@
           <a:p>
             <a:fld id="{90361390-4E53-E84E-AD55-1B7C77486D52}" type="slidenum">
               <a:rPr lang="es-ES_tradnl" smtClean="0"/>
-              <a:t>‹#›</a:t>
+              <a:t>‹Nº›</a:t>
             </a:fld>
             <a:endParaRPr lang="es-ES_tradnl"/>
           </a:p>
@@ -1829,7 +1829,7 @@
           <a:p>
             <a:fld id="{90361390-4E53-E84E-AD55-1B7C77486D52}" type="slidenum">
               <a:rPr lang="es-ES_tradnl" smtClean="0"/>
-              <a:t>‹#›</a:t>
+              <a:t>‹Nº›</a:t>
             </a:fld>
             <a:endParaRPr lang="es-ES_tradnl"/>
           </a:p>
@@ -2196,7 +2196,7 @@
           <a:p>
             <a:fld id="{90361390-4E53-E84E-AD55-1B7C77486D52}" type="slidenum">
               <a:rPr lang="es-ES_tradnl" smtClean="0"/>
-              <a:t>‹#›</a:t>
+              <a:t>‹Nº›</a:t>
             </a:fld>
             <a:endParaRPr lang="es-ES_tradnl"/>
           </a:p>
@@ -2314,7 +2314,7 @@
           <a:p>
             <a:fld id="{90361390-4E53-E84E-AD55-1B7C77486D52}" type="slidenum">
               <a:rPr lang="es-ES_tradnl" smtClean="0"/>
-              <a:t>‹#›</a:t>
+              <a:t>‹Nº›</a:t>
             </a:fld>
             <a:endParaRPr lang="es-ES_tradnl"/>
           </a:p>
@@ -2409,7 +2409,7 @@
           <a:p>
             <a:fld id="{90361390-4E53-E84E-AD55-1B7C77486D52}" type="slidenum">
               <a:rPr lang="es-ES_tradnl" smtClean="0"/>
-              <a:t>‹#›</a:t>
+              <a:t>‹Nº›</a:t>
             </a:fld>
             <a:endParaRPr lang="es-ES_tradnl"/>
           </a:p>
@@ -2686,7 +2686,7 @@
           <a:p>
             <a:fld id="{90361390-4E53-E84E-AD55-1B7C77486D52}" type="slidenum">
               <a:rPr lang="es-ES_tradnl" smtClean="0"/>
-              <a:t>‹#›</a:t>
+              <a:t>‹Nº›</a:t>
             </a:fld>
             <a:endParaRPr lang="es-ES_tradnl"/>
           </a:p>
@@ -2939,7 +2939,7 @@
           <a:p>
             <a:fld id="{90361390-4E53-E84E-AD55-1B7C77486D52}" type="slidenum">
               <a:rPr lang="es-ES_tradnl" smtClean="0"/>
-              <a:t>‹#›</a:t>
+              <a:t>‹Nº›</a:t>
             </a:fld>
             <a:endParaRPr lang="es-ES_tradnl"/>
           </a:p>
@@ -3188,7 +3188,7 @@
           <a:p>
             <a:fld id="{90361390-4E53-E84E-AD55-1B7C77486D52}" type="slidenum">
               <a:rPr lang="es-ES_tradnl" smtClean="0"/>
-              <a:t>‹#›</a:t>
+              <a:t>‹Nº›</a:t>
             </a:fld>
             <a:endParaRPr lang="es-ES_tradnl"/>
           </a:p>
@@ -3667,15 +3667,7 @@
                   <a:srgbClr val="C00000"/>
                 </a:solidFill>
               </a:rPr>
-              <a:t>Alumnos</a:t>
-            </a:r>
-            <a:r>
-              <a:rPr lang="es-ES_tradnl" sz="1200" b="1" u="sng" dirty="0" smtClean="0">
-                <a:solidFill>
-                  <a:srgbClr val="C00000"/>
-                </a:solidFill>
-              </a:rPr>
-              <a:t>:</a:t>
+              <a:t>Alumnos:</a:t>
             </a:r>
             <a:endParaRPr lang="es-ES_tradnl" sz="1200" u="sng" dirty="0">
               <a:solidFill>
@@ -4255,11 +4247,41 @@
                 <a:tableStyleId>{5C22544A-7EE6-4342-B048-85BDC9FD1C3A}</a:tableStyleId>
               </a:tblPr>
               <a:tblGrid>
-                <a:gridCol w="373383"/>
-                <a:gridCol w="3322932"/>
-                <a:gridCol w="2374450"/>
-                <a:gridCol w="1211706"/>
-                <a:gridCol w="729981"/>
+                <a:gridCol w="373383">
+                  <a:extLst>
+                    <a:ext uri="{9D8B030D-6E8A-4147-A177-3AD203B41FA5}">
+                      <a16:colId xmlns:a16="http://schemas.microsoft.com/office/drawing/2014/main" val="20000"/>
+                    </a:ext>
+                  </a:extLst>
+                </a:gridCol>
+                <a:gridCol w="3322932">
+                  <a:extLst>
+                    <a:ext uri="{9D8B030D-6E8A-4147-A177-3AD203B41FA5}">
+                      <a16:colId xmlns:a16="http://schemas.microsoft.com/office/drawing/2014/main" val="20001"/>
+                    </a:ext>
+                  </a:extLst>
+                </a:gridCol>
+                <a:gridCol w="2374450">
+                  <a:extLst>
+                    <a:ext uri="{9D8B030D-6E8A-4147-A177-3AD203B41FA5}">
+                      <a16:colId xmlns:a16="http://schemas.microsoft.com/office/drawing/2014/main" val="20002"/>
+                    </a:ext>
+                  </a:extLst>
+                </a:gridCol>
+                <a:gridCol w="1211706">
+                  <a:extLst>
+                    <a:ext uri="{9D8B030D-6E8A-4147-A177-3AD203B41FA5}">
+                      <a16:colId xmlns:a16="http://schemas.microsoft.com/office/drawing/2014/main" val="20003"/>
+                    </a:ext>
+                  </a:extLst>
+                </a:gridCol>
+                <a:gridCol w="729981">
+                  <a:extLst>
+                    <a:ext uri="{9D8B030D-6E8A-4147-A177-3AD203B41FA5}">
+                      <a16:colId xmlns:a16="http://schemas.microsoft.com/office/drawing/2014/main" val="20004"/>
+                    </a:ext>
+                  </a:extLst>
+                </a:gridCol>
               </a:tblGrid>
               <a:tr h="93663">
                 <a:tc>
@@ -4422,6 +4444,11 @@
                   </a:txBody>
                   <a:tcPr marL="23623" marR="23623" marT="0" marB="0"/>
                 </a:tc>
+                <a:extLst>
+                  <a:ext uri="{0D108BD9-81ED-4DB2-BD59-A6C34878D82A}">
+                    <a16:rowId xmlns:a16="http://schemas.microsoft.com/office/drawing/2014/main" val="10000"/>
+                  </a:ext>
+                </a:extLst>
               </a:tr>
               <a:tr h="156084">
                 <a:tc rowSpan="12">
@@ -4620,6 +4647,11 @@
                   </a:txBody>
                   <a:tcPr marL="23623" marR="23623" marT="0" marB="0"/>
                 </a:tc>
+                <a:extLst>
+                  <a:ext uri="{0D108BD9-81ED-4DB2-BD59-A6C34878D82A}">
+                    <a16:rowId xmlns:a16="http://schemas.microsoft.com/office/drawing/2014/main" val="10001"/>
+                  </a:ext>
+                </a:extLst>
               </a:tr>
               <a:tr h="92566">
                 <a:tc vMerge="1">
@@ -4760,6 +4792,11 @@
                   </a:txBody>
                   <a:tcPr marL="23623" marR="23623" marT="0" marB="0"/>
                 </a:tc>
+                <a:extLst>
+                  <a:ext uri="{0D108BD9-81ED-4DB2-BD59-A6C34878D82A}">
+                    <a16:rowId xmlns:a16="http://schemas.microsoft.com/office/drawing/2014/main" val="10002"/>
+                  </a:ext>
+                </a:extLst>
               </a:tr>
               <a:tr h="92566">
                 <a:tc vMerge="1">
@@ -4900,6 +4937,11 @@
                   </a:txBody>
                   <a:tcPr marL="23623" marR="23623" marT="0" marB="0"/>
                 </a:tc>
+                <a:extLst>
+                  <a:ext uri="{0D108BD9-81ED-4DB2-BD59-A6C34878D82A}">
+                    <a16:rowId xmlns:a16="http://schemas.microsoft.com/office/drawing/2014/main" val="10003"/>
+                  </a:ext>
+                </a:extLst>
               </a:tr>
               <a:tr h="92566">
                 <a:tc vMerge="1">
@@ -5052,6 +5094,11 @@
                   </a:txBody>
                   <a:tcPr marL="23623" marR="23623" marT="0" marB="0"/>
                 </a:tc>
+                <a:extLst>
+                  <a:ext uri="{0D108BD9-81ED-4DB2-BD59-A6C34878D82A}">
+                    <a16:rowId xmlns:a16="http://schemas.microsoft.com/office/drawing/2014/main" val="10004"/>
+                  </a:ext>
+                </a:extLst>
               </a:tr>
               <a:tr h="92566">
                 <a:tc vMerge="1">
@@ -5192,6 +5239,11 @@
                   </a:txBody>
                   <a:tcPr marL="23623" marR="23623" marT="0" marB="0"/>
                 </a:tc>
+                <a:extLst>
+                  <a:ext uri="{0D108BD9-81ED-4DB2-BD59-A6C34878D82A}">
+                    <a16:rowId xmlns:a16="http://schemas.microsoft.com/office/drawing/2014/main" val="10005"/>
+                  </a:ext>
+                </a:extLst>
               </a:tr>
               <a:tr h="92566">
                 <a:tc vMerge="1">
@@ -5332,6 +5384,11 @@
                   </a:txBody>
                   <a:tcPr marL="23623" marR="23623" marT="0" marB="0"/>
                 </a:tc>
+                <a:extLst>
+                  <a:ext uri="{0D108BD9-81ED-4DB2-BD59-A6C34878D82A}">
+                    <a16:rowId xmlns:a16="http://schemas.microsoft.com/office/drawing/2014/main" val="10006"/>
+                  </a:ext>
+                </a:extLst>
               </a:tr>
               <a:tr h="92566">
                 <a:tc vMerge="1">
@@ -5472,6 +5529,11 @@
                   </a:txBody>
                   <a:tcPr marL="23623" marR="23623" marT="0" marB="0"/>
                 </a:tc>
+                <a:extLst>
+                  <a:ext uri="{0D108BD9-81ED-4DB2-BD59-A6C34878D82A}">
+                    <a16:rowId xmlns:a16="http://schemas.microsoft.com/office/drawing/2014/main" val="10007"/>
+                  </a:ext>
+                </a:extLst>
               </a:tr>
               <a:tr h="92566">
                 <a:tc vMerge="1">
@@ -5612,6 +5674,11 @@
                   </a:txBody>
                   <a:tcPr marL="23623" marR="23623" marT="0" marB="0"/>
                 </a:tc>
+                <a:extLst>
+                  <a:ext uri="{0D108BD9-81ED-4DB2-BD59-A6C34878D82A}">
+                    <a16:rowId xmlns:a16="http://schemas.microsoft.com/office/drawing/2014/main" val="10008"/>
+                  </a:ext>
+                </a:extLst>
               </a:tr>
               <a:tr h="92566">
                 <a:tc vMerge="1">
@@ -5752,6 +5819,11 @@
                   </a:txBody>
                   <a:tcPr marL="23623" marR="23623" marT="0" marB="0"/>
                 </a:tc>
+                <a:extLst>
+                  <a:ext uri="{0D108BD9-81ED-4DB2-BD59-A6C34878D82A}">
+                    <a16:rowId xmlns:a16="http://schemas.microsoft.com/office/drawing/2014/main" val="10009"/>
+                  </a:ext>
+                </a:extLst>
               </a:tr>
               <a:tr h="92566">
                 <a:tc vMerge="1">
@@ -5892,6 +5964,11 @@
                   </a:txBody>
                   <a:tcPr marL="23623" marR="23623" marT="0" marB="0"/>
                 </a:tc>
+                <a:extLst>
+                  <a:ext uri="{0D108BD9-81ED-4DB2-BD59-A6C34878D82A}">
+                    <a16:rowId xmlns:a16="http://schemas.microsoft.com/office/drawing/2014/main" val="10010"/>
+                  </a:ext>
+                </a:extLst>
               </a:tr>
               <a:tr h="92566">
                 <a:tc vMerge="1">
@@ -6032,6 +6109,11 @@
                   </a:txBody>
                   <a:tcPr marL="23623" marR="23623" marT="0" marB="0"/>
                 </a:tc>
+                <a:extLst>
+                  <a:ext uri="{0D108BD9-81ED-4DB2-BD59-A6C34878D82A}">
+                    <a16:rowId xmlns:a16="http://schemas.microsoft.com/office/drawing/2014/main" val="10011"/>
+                  </a:ext>
+                </a:extLst>
               </a:tr>
               <a:tr h="0">
                 <a:tc vMerge="1">
@@ -6178,6 +6260,11 @@
                   </a:txBody>
                   <a:tcPr marL="23623" marR="23623" marT="0" marB="0"/>
                 </a:tc>
+                <a:extLst>
+                  <a:ext uri="{0D108BD9-81ED-4DB2-BD59-A6C34878D82A}">
+                    <a16:rowId xmlns:a16="http://schemas.microsoft.com/office/drawing/2014/main" val="10012"/>
+                  </a:ext>
+                </a:extLst>
               </a:tr>
               <a:tr h="156084">
                 <a:tc rowSpan="9">
@@ -6370,6 +6457,11 @@
                   </a:txBody>
                   <a:tcPr marL="23623" marR="23623" marT="0" marB="0"/>
                 </a:tc>
+                <a:extLst>
+                  <a:ext uri="{0D108BD9-81ED-4DB2-BD59-A6C34878D82A}">
+                    <a16:rowId xmlns:a16="http://schemas.microsoft.com/office/drawing/2014/main" val="10013"/>
+                  </a:ext>
+                </a:extLst>
               </a:tr>
               <a:tr h="104151">
                 <a:tc vMerge="1">
@@ -6510,6 +6602,11 @@
                   </a:txBody>
                   <a:tcPr marL="23623" marR="23623" marT="0" marB="0"/>
                 </a:tc>
+                <a:extLst>
+                  <a:ext uri="{0D108BD9-81ED-4DB2-BD59-A6C34878D82A}">
+                    <a16:rowId xmlns:a16="http://schemas.microsoft.com/office/drawing/2014/main" val="10014"/>
+                  </a:ext>
+                </a:extLst>
               </a:tr>
               <a:tr h="124217">
                 <a:tc vMerge="1">
@@ -6650,6 +6747,11 @@
                   </a:txBody>
                   <a:tcPr marL="23623" marR="23623" marT="0" marB="0"/>
                 </a:tc>
+                <a:extLst>
+                  <a:ext uri="{0D108BD9-81ED-4DB2-BD59-A6C34878D82A}">
+                    <a16:rowId xmlns:a16="http://schemas.microsoft.com/office/drawing/2014/main" val="10015"/>
+                  </a:ext>
+                </a:extLst>
               </a:tr>
               <a:tr h="156084">
                 <a:tc vMerge="1">
@@ -6790,6 +6892,11 @@
                   </a:txBody>
                   <a:tcPr marL="23623" marR="23623" marT="0" marB="0"/>
                 </a:tc>
+                <a:extLst>
+                  <a:ext uri="{0D108BD9-81ED-4DB2-BD59-A6C34878D82A}">
+                    <a16:rowId xmlns:a16="http://schemas.microsoft.com/office/drawing/2014/main" val="10016"/>
+                  </a:ext>
+                </a:extLst>
               </a:tr>
               <a:tr h="132979">
                 <a:tc vMerge="1">
@@ -6930,6 +7037,11 @@
                   </a:txBody>
                   <a:tcPr marL="23623" marR="23623" marT="0" marB="0"/>
                 </a:tc>
+                <a:extLst>
+                  <a:ext uri="{0D108BD9-81ED-4DB2-BD59-A6C34878D82A}">
+                    <a16:rowId xmlns:a16="http://schemas.microsoft.com/office/drawing/2014/main" val="10017"/>
+                  </a:ext>
+                </a:extLst>
               </a:tr>
               <a:tr h="156084">
                 <a:tc vMerge="1">
@@ -7082,6 +7194,11 @@
                   </a:txBody>
                   <a:tcPr marL="23623" marR="23623" marT="0" marB="0"/>
                 </a:tc>
+                <a:extLst>
+                  <a:ext uri="{0D108BD9-81ED-4DB2-BD59-A6C34878D82A}">
+                    <a16:rowId xmlns:a16="http://schemas.microsoft.com/office/drawing/2014/main" val="10018"/>
+                  </a:ext>
+                </a:extLst>
               </a:tr>
               <a:tr h="118236">
                 <a:tc vMerge="1">
@@ -7222,6 +7339,11 @@
                   </a:txBody>
                   <a:tcPr marL="23623" marR="23623" marT="0" marB="0"/>
                 </a:tc>
+                <a:extLst>
+                  <a:ext uri="{0D108BD9-81ED-4DB2-BD59-A6C34878D82A}">
+                    <a16:rowId xmlns:a16="http://schemas.microsoft.com/office/drawing/2014/main" val="10019"/>
+                  </a:ext>
+                </a:extLst>
               </a:tr>
               <a:tr h="156084">
                 <a:tc vMerge="1">
@@ -7362,6 +7484,11 @@
                   </a:txBody>
                   <a:tcPr marL="23623" marR="23623" marT="0" marB="0"/>
                 </a:tc>
+                <a:extLst>
+                  <a:ext uri="{0D108BD9-81ED-4DB2-BD59-A6C34878D82A}">
+                    <a16:rowId xmlns:a16="http://schemas.microsoft.com/office/drawing/2014/main" val="10020"/>
+                  </a:ext>
+                </a:extLst>
               </a:tr>
               <a:tr h="92566">
                 <a:tc vMerge="1">
@@ -7502,6 +7629,11 @@
                   </a:txBody>
                   <a:tcPr marL="23623" marR="23623" marT="0" marB="0"/>
                 </a:tc>
+                <a:extLst>
+                  <a:ext uri="{0D108BD9-81ED-4DB2-BD59-A6C34878D82A}">
+                    <a16:rowId xmlns:a16="http://schemas.microsoft.com/office/drawing/2014/main" val="10021"/>
+                  </a:ext>
+                </a:extLst>
               </a:tr>
               <a:tr h="140650">
                 <a:tc rowSpan="13">
@@ -7670,6 +7802,11 @@
                   </a:txBody>
                   <a:tcPr marL="23623" marR="23623" marT="0" marB="0"/>
                 </a:tc>
+                <a:extLst>
+                  <a:ext uri="{0D108BD9-81ED-4DB2-BD59-A6C34878D82A}">
+                    <a16:rowId xmlns:a16="http://schemas.microsoft.com/office/drawing/2014/main" val="10022"/>
+                  </a:ext>
+                </a:extLst>
               </a:tr>
               <a:tr h="156084">
                 <a:tc vMerge="1">
@@ -7810,6 +7947,11 @@
                   </a:txBody>
                   <a:tcPr marL="23623" marR="23623" marT="0" marB="0"/>
                 </a:tc>
+                <a:extLst>
+                  <a:ext uri="{0D108BD9-81ED-4DB2-BD59-A6C34878D82A}">
+                    <a16:rowId xmlns:a16="http://schemas.microsoft.com/office/drawing/2014/main" val="10023"/>
+                  </a:ext>
+                </a:extLst>
               </a:tr>
               <a:tr h="156084">
                 <a:tc vMerge="1">
@@ -7950,6 +8092,11 @@
                   </a:txBody>
                   <a:tcPr marL="23623" marR="23623" marT="0" marB="0"/>
                 </a:tc>
+                <a:extLst>
+                  <a:ext uri="{0D108BD9-81ED-4DB2-BD59-A6C34878D82A}">
+                    <a16:rowId xmlns:a16="http://schemas.microsoft.com/office/drawing/2014/main" val="10024"/>
+                  </a:ext>
+                </a:extLst>
               </a:tr>
               <a:tr h="156084">
                 <a:tc vMerge="1">
@@ -8090,6 +8237,11 @@
                   </a:txBody>
                   <a:tcPr marL="23623" marR="23623" marT="0" marB="0"/>
                 </a:tc>
+                <a:extLst>
+                  <a:ext uri="{0D108BD9-81ED-4DB2-BD59-A6C34878D82A}">
+                    <a16:rowId xmlns:a16="http://schemas.microsoft.com/office/drawing/2014/main" val="10025"/>
+                  </a:ext>
+                </a:extLst>
               </a:tr>
               <a:tr h="92566">
                 <a:tc vMerge="1">
@@ -8230,6 +8382,11 @@
                   </a:txBody>
                   <a:tcPr marL="23623" marR="23623" marT="0" marB="0"/>
                 </a:tc>
+                <a:extLst>
+                  <a:ext uri="{0D108BD9-81ED-4DB2-BD59-A6C34878D82A}">
+                    <a16:rowId xmlns:a16="http://schemas.microsoft.com/office/drawing/2014/main" val="10026"/>
+                  </a:ext>
+                </a:extLst>
               </a:tr>
               <a:tr h="92566">
                 <a:tc vMerge="1">
@@ -8370,6 +8527,11 @@
                   </a:txBody>
                   <a:tcPr marL="23623" marR="23623" marT="0" marB="0"/>
                 </a:tc>
+                <a:extLst>
+                  <a:ext uri="{0D108BD9-81ED-4DB2-BD59-A6C34878D82A}">
+                    <a16:rowId xmlns:a16="http://schemas.microsoft.com/office/drawing/2014/main" val="10027"/>
+                  </a:ext>
+                </a:extLst>
               </a:tr>
               <a:tr h="156084">
                 <a:tc vMerge="1">
@@ -8510,6 +8672,11 @@
                   </a:txBody>
                   <a:tcPr marL="23623" marR="23623" marT="0" marB="0"/>
                 </a:tc>
+                <a:extLst>
+                  <a:ext uri="{0D108BD9-81ED-4DB2-BD59-A6C34878D82A}">
+                    <a16:rowId xmlns:a16="http://schemas.microsoft.com/office/drawing/2014/main" val="10028"/>
+                  </a:ext>
+                </a:extLst>
               </a:tr>
               <a:tr h="235874">
                 <a:tc vMerge="1">
@@ -8650,6 +8817,11 @@
                   </a:txBody>
                   <a:tcPr marL="23623" marR="23623" marT="0" marB="0"/>
                 </a:tc>
+                <a:extLst>
+                  <a:ext uri="{0D108BD9-81ED-4DB2-BD59-A6C34878D82A}">
+                    <a16:rowId xmlns:a16="http://schemas.microsoft.com/office/drawing/2014/main" val="10029"/>
+                  </a:ext>
+                </a:extLst>
               </a:tr>
               <a:tr h="235874">
                 <a:tc vMerge="1">
@@ -8790,6 +8962,11 @@
                   </a:txBody>
                   <a:tcPr marL="23623" marR="23623" marT="0" marB="0"/>
                 </a:tc>
+                <a:extLst>
+                  <a:ext uri="{0D108BD9-81ED-4DB2-BD59-A6C34878D82A}">
+                    <a16:rowId xmlns:a16="http://schemas.microsoft.com/office/drawing/2014/main" val="10030"/>
+                  </a:ext>
+                </a:extLst>
               </a:tr>
               <a:tr h="120926">
                 <a:tc vMerge="1">
@@ -8930,6 +9107,11 @@
                   </a:txBody>
                   <a:tcPr marL="23623" marR="23623" marT="0" marB="0"/>
                 </a:tc>
+                <a:extLst>
+                  <a:ext uri="{0D108BD9-81ED-4DB2-BD59-A6C34878D82A}">
+                    <a16:rowId xmlns:a16="http://schemas.microsoft.com/office/drawing/2014/main" val="10031"/>
+                  </a:ext>
+                </a:extLst>
               </a:tr>
               <a:tr h="92566">
                 <a:tc vMerge="1">
@@ -9070,6 +9252,11 @@
                   </a:txBody>
                   <a:tcPr marL="23623" marR="23623" marT="0" marB="0"/>
                 </a:tc>
+                <a:extLst>
+                  <a:ext uri="{0D108BD9-81ED-4DB2-BD59-A6C34878D82A}">
+                    <a16:rowId xmlns:a16="http://schemas.microsoft.com/office/drawing/2014/main" val="10032"/>
+                  </a:ext>
+                </a:extLst>
               </a:tr>
               <a:tr h="92566">
                 <a:tc vMerge="1">
@@ -9210,6 +9397,11 @@
                   </a:txBody>
                   <a:tcPr marL="23623" marR="23623" marT="0" marB="0"/>
                 </a:tc>
+                <a:extLst>
+                  <a:ext uri="{0D108BD9-81ED-4DB2-BD59-A6C34878D82A}">
+                    <a16:rowId xmlns:a16="http://schemas.microsoft.com/office/drawing/2014/main" val="10033"/>
+                  </a:ext>
+                </a:extLst>
               </a:tr>
               <a:tr h="156084">
                 <a:tc vMerge="1">
@@ -9350,6 +9542,11 @@
                   </a:txBody>
                   <a:tcPr marL="23623" marR="23623" marT="0" marB="0"/>
                 </a:tc>
+                <a:extLst>
+                  <a:ext uri="{0D108BD9-81ED-4DB2-BD59-A6C34878D82A}">
+                    <a16:rowId xmlns:a16="http://schemas.microsoft.com/office/drawing/2014/main" val="10034"/>
+                  </a:ext>
+                </a:extLst>
               </a:tr>
               <a:tr h="164045">
                 <a:tc rowSpan="4">
@@ -9567,6 +9764,11 @@
                   </a:txBody>
                   <a:tcPr marL="23623" marR="23623" marT="0" marB="0" anchor="ctr"/>
                 </a:tc>
+                <a:extLst>
+                  <a:ext uri="{0D108BD9-81ED-4DB2-BD59-A6C34878D82A}">
+                    <a16:rowId xmlns:a16="http://schemas.microsoft.com/office/drawing/2014/main" val="10035"/>
+                  </a:ext>
+                </a:extLst>
               </a:tr>
               <a:tr h="106719">
                 <a:tc vMerge="1">
@@ -9707,6 +9909,11 @@
                   </a:txBody>
                   <a:tcPr marL="23623" marR="23623" marT="0" marB="0" anchor="ctr"/>
                 </a:tc>
+                <a:extLst>
+                  <a:ext uri="{0D108BD9-81ED-4DB2-BD59-A6C34878D82A}">
+                    <a16:rowId xmlns:a16="http://schemas.microsoft.com/office/drawing/2014/main" val="10036"/>
+                  </a:ext>
+                </a:extLst>
               </a:tr>
               <a:tr h="50869">
                 <a:tc vMerge="1">
@@ -9847,6 +10054,11 @@
                   </a:txBody>
                   <a:tcPr marL="23623" marR="23623" marT="0" marB="0" anchor="ctr"/>
                 </a:tc>
+                <a:extLst>
+                  <a:ext uri="{0D108BD9-81ED-4DB2-BD59-A6C34878D82A}">
+                    <a16:rowId xmlns:a16="http://schemas.microsoft.com/office/drawing/2014/main" val="10037"/>
+                  </a:ext>
+                </a:extLst>
               </a:tr>
               <a:tr h="313573">
                 <a:tc vMerge="1">
@@ -10003,6 +10215,11 @@
                   </a:txBody>
                   <a:tcPr marL="23623" marR="23623" marT="0" marB="0"/>
                 </a:tc>
+                <a:extLst>
+                  <a:ext uri="{0D108BD9-81ED-4DB2-BD59-A6C34878D82A}">
+                    <a16:rowId xmlns:a16="http://schemas.microsoft.com/office/drawing/2014/main" val="10038"/>
+                  </a:ext>
+                </a:extLst>
               </a:tr>
             </a:tbl>
           </a:graphicData>
@@ -10270,15 +10487,7 @@
             </a:r>
             <a:r>
               <a:rPr lang="es-VE" sz="1400" b="1" dirty="0" smtClean="0"/>
-              <a:t>$</a:t>
-            </a:r>
-            <a:r>
-              <a:rPr lang="es-VE" sz="1400" b="1" dirty="0" smtClean="0"/>
-              <a:t>450</a:t>
-            </a:r>
-            <a:r>
-              <a:rPr lang="es-VE" sz="1400" b="1" dirty="0" smtClean="0"/>
-              <a:t>,000</a:t>
+              <a:t>$450,000</a:t>
             </a:r>
             <a:endParaRPr lang="es-VE" sz="1400" dirty="0"/>
           </a:p>
@@ -10610,11 +10819,41 @@
                 <a:tableStyleId>{5C22544A-7EE6-4342-B048-85BDC9FD1C3A}</a:tableStyleId>
               </a:tblPr>
               <a:tblGrid>
-                <a:gridCol w="2185874"/>
-                <a:gridCol w="1992812"/>
-                <a:gridCol w="4152296"/>
-                <a:gridCol w="2195716"/>
-                <a:gridCol w="563866"/>
+                <a:gridCol w="2185874">
+                  <a:extLst>
+                    <a:ext uri="{9D8B030D-6E8A-4147-A177-3AD203B41FA5}">
+                      <a16:colId xmlns:a16="http://schemas.microsoft.com/office/drawing/2014/main" val="20000"/>
+                    </a:ext>
+                  </a:extLst>
+                </a:gridCol>
+                <a:gridCol w="1992812">
+                  <a:extLst>
+                    <a:ext uri="{9D8B030D-6E8A-4147-A177-3AD203B41FA5}">
+                      <a16:colId xmlns:a16="http://schemas.microsoft.com/office/drawing/2014/main" val="20001"/>
+                    </a:ext>
+                  </a:extLst>
+                </a:gridCol>
+                <a:gridCol w="4152296">
+                  <a:extLst>
+                    <a:ext uri="{9D8B030D-6E8A-4147-A177-3AD203B41FA5}">
+                      <a16:colId xmlns:a16="http://schemas.microsoft.com/office/drawing/2014/main" val="20002"/>
+                    </a:ext>
+                  </a:extLst>
+                </a:gridCol>
+                <a:gridCol w="2195716">
+                  <a:extLst>
+                    <a:ext uri="{9D8B030D-6E8A-4147-A177-3AD203B41FA5}">
+                      <a16:colId xmlns:a16="http://schemas.microsoft.com/office/drawing/2014/main" val="20003"/>
+                    </a:ext>
+                  </a:extLst>
+                </a:gridCol>
+                <a:gridCol w="563866">
+                  <a:extLst>
+                    <a:ext uri="{9D8B030D-6E8A-4147-A177-3AD203B41FA5}">
+                      <a16:colId xmlns:a16="http://schemas.microsoft.com/office/drawing/2014/main" val="20004"/>
+                    </a:ext>
+                  </a:extLst>
+                </a:gridCol>
               </a:tblGrid>
               <a:tr h="228600">
                 <a:tc>
@@ -10762,6 +11001,11 @@
                   </a:txBody>
                   <a:tcPr marL="11204" marR="11204" marT="0" marB="0" anchor="ctr"/>
                 </a:tc>
+                <a:extLst>
+                  <a:ext uri="{0D108BD9-81ED-4DB2-BD59-A6C34878D82A}">
+                    <a16:rowId xmlns:a16="http://schemas.microsoft.com/office/drawing/2014/main" val="10000"/>
+                  </a:ext>
+                </a:extLst>
               </a:tr>
               <a:tr h="685799">
                 <a:tc>
@@ -10909,6 +11153,11 @@
                   </a:txBody>
                   <a:tcPr marL="11204" marR="11204" marT="0" marB="0" anchor="ctr"/>
                 </a:tc>
+                <a:extLst>
+                  <a:ext uri="{0D108BD9-81ED-4DB2-BD59-A6C34878D82A}">
+                    <a16:rowId xmlns:a16="http://schemas.microsoft.com/office/drawing/2014/main" val="10001"/>
+                  </a:ext>
+                </a:extLst>
               </a:tr>
               <a:tr h="481987">
                 <a:tc>
@@ -11056,6 +11305,11 @@
                   </a:txBody>
                   <a:tcPr marL="11204" marR="11204" marT="0" marB="0" anchor="ctr"/>
                 </a:tc>
+                <a:extLst>
+                  <a:ext uri="{0D108BD9-81ED-4DB2-BD59-A6C34878D82A}">
+                    <a16:rowId xmlns:a16="http://schemas.microsoft.com/office/drawing/2014/main" val="10002"/>
+                  </a:ext>
+                </a:extLst>
               </a:tr>
               <a:tr h="481987">
                 <a:tc>
@@ -11203,6 +11457,11 @@
                   </a:txBody>
                   <a:tcPr marL="11204" marR="11204" marT="0" marB="0" anchor="ctr"/>
                 </a:tc>
+                <a:extLst>
+                  <a:ext uri="{0D108BD9-81ED-4DB2-BD59-A6C34878D82A}">
+                    <a16:rowId xmlns:a16="http://schemas.microsoft.com/office/drawing/2014/main" val="10003"/>
+                  </a:ext>
+                </a:extLst>
               </a:tr>
               <a:tr h="688554">
                 <a:tc>
@@ -11350,6 +11609,11 @@
                   </a:txBody>
                   <a:tcPr marL="11204" marR="11204" marT="0" marB="0" anchor="ctr"/>
                 </a:tc>
+                <a:extLst>
+                  <a:ext uri="{0D108BD9-81ED-4DB2-BD59-A6C34878D82A}">
+                    <a16:rowId xmlns:a16="http://schemas.microsoft.com/office/drawing/2014/main" val="10004"/>
+                  </a:ext>
+                </a:extLst>
               </a:tr>
               <a:tr h="445588">
                 <a:tc>
@@ -11497,6 +11761,11 @@
                   </a:txBody>
                   <a:tcPr marL="11204" marR="11204" marT="0" marB="0" anchor="ctr"/>
                 </a:tc>
+                <a:extLst>
+                  <a:ext uri="{0D108BD9-81ED-4DB2-BD59-A6C34878D82A}">
+                    <a16:rowId xmlns:a16="http://schemas.microsoft.com/office/drawing/2014/main" val="10005"/>
+                  </a:ext>
+                </a:extLst>
               </a:tr>
               <a:tr h="619699">
                 <a:tc>
@@ -11644,6 +11913,11 @@
                   </a:txBody>
                   <a:tcPr marL="11204" marR="11204" marT="0" marB="0" anchor="ctr"/>
                 </a:tc>
+                <a:extLst>
+                  <a:ext uri="{0D108BD9-81ED-4DB2-BD59-A6C34878D82A}">
+                    <a16:rowId xmlns:a16="http://schemas.microsoft.com/office/drawing/2014/main" val="10006"/>
+                  </a:ext>
+                </a:extLst>
               </a:tr>
               <a:tr h="819641">
                 <a:tc>
@@ -11791,6 +12065,11 @@
                   </a:txBody>
                   <a:tcPr marL="11204" marR="11204" marT="0" marB="0" anchor="ctr"/>
                 </a:tc>
+                <a:extLst>
+                  <a:ext uri="{0D108BD9-81ED-4DB2-BD59-A6C34878D82A}">
+                    <a16:rowId xmlns:a16="http://schemas.microsoft.com/office/drawing/2014/main" val="10007"/>
+                  </a:ext>
+                </a:extLst>
               </a:tr>
               <a:tr h="146344">
                 <a:tc>
@@ -11938,6 +12217,11 @@
                   </a:txBody>
                   <a:tcPr marL="11204" marR="11204" marT="0" marB="0" anchor="ctr"/>
                 </a:tc>
+                <a:extLst>
+                  <a:ext uri="{0D108BD9-81ED-4DB2-BD59-A6C34878D82A}">
+                    <a16:rowId xmlns:a16="http://schemas.microsoft.com/office/drawing/2014/main" val="10008"/>
+                  </a:ext>
+                </a:extLst>
               </a:tr>
               <a:tr h="221155">
                 <a:tc>
@@ -12085,6 +12369,11 @@
                   </a:txBody>
                   <a:tcPr marL="11204" marR="11204" marT="0" marB="0" anchor="ctr"/>
                 </a:tc>
+                <a:extLst>
+                  <a:ext uri="{0D108BD9-81ED-4DB2-BD59-A6C34878D82A}">
+                    <a16:rowId xmlns:a16="http://schemas.microsoft.com/office/drawing/2014/main" val="10009"/>
+                  </a:ext>
+                </a:extLst>
               </a:tr>
               <a:tr h="520399">
                 <a:tc>
@@ -12232,6 +12521,11 @@
                   </a:txBody>
                   <a:tcPr marL="11204" marR="11204" marT="0" marB="0" anchor="ctr"/>
                 </a:tc>
+                <a:extLst>
+                  <a:ext uri="{0D108BD9-81ED-4DB2-BD59-A6C34878D82A}">
+                    <a16:rowId xmlns:a16="http://schemas.microsoft.com/office/drawing/2014/main" val="10010"/>
+                  </a:ext>
+                </a:extLst>
               </a:tr>
             </a:tbl>
           </a:graphicData>
@@ -12358,10 +12652,34 @@
                 <a:tableStyleId>{5C22544A-7EE6-4342-B048-85BDC9FD1C3A}</a:tableStyleId>
               </a:tblPr>
               <a:tblGrid>
-                <a:gridCol w="3134594"/>
-                <a:gridCol w="2053087"/>
-                <a:gridCol w="1170301"/>
-                <a:gridCol w="2286016"/>
+                <a:gridCol w="3134594">
+                  <a:extLst>
+                    <a:ext uri="{9D8B030D-6E8A-4147-A177-3AD203B41FA5}">
+                      <a16:colId xmlns:a16="http://schemas.microsoft.com/office/drawing/2014/main" val="20000"/>
+                    </a:ext>
+                  </a:extLst>
+                </a:gridCol>
+                <a:gridCol w="2053087">
+                  <a:extLst>
+                    <a:ext uri="{9D8B030D-6E8A-4147-A177-3AD203B41FA5}">
+                      <a16:colId xmlns:a16="http://schemas.microsoft.com/office/drawing/2014/main" val="20001"/>
+                    </a:ext>
+                  </a:extLst>
+                </a:gridCol>
+                <a:gridCol w="1170301">
+                  <a:extLst>
+                    <a:ext uri="{9D8B030D-6E8A-4147-A177-3AD203B41FA5}">
+                      <a16:colId xmlns:a16="http://schemas.microsoft.com/office/drawing/2014/main" val="20002"/>
+                    </a:ext>
+                  </a:extLst>
+                </a:gridCol>
+                <a:gridCol w="2286016">
+                  <a:extLst>
+                    <a:ext uri="{9D8B030D-6E8A-4147-A177-3AD203B41FA5}">
+                      <a16:colId xmlns:a16="http://schemas.microsoft.com/office/drawing/2014/main" val="20003"/>
+                    </a:ext>
+                  </a:extLst>
+                </a:gridCol>
               </a:tblGrid>
               <a:tr h="357190">
                 <a:tc>
@@ -12428,6 +12746,11 @@
                   </a:txBody>
                   <a:tcPr/>
                 </a:tc>
+                <a:extLst>
+                  <a:ext uri="{0D108BD9-81ED-4DB2-BD59-A6C34878D82A}">
+                    <a16:rowId xmlns:a16="http://schemas.microsoft.com/office/drawing/2014/main" val="10000"/>
+                  </a:ext>
+                </a:extLst>
               </a:tr>
               <a:tr h="357190">
                 <a:tc>
@@ -12491,14 +12814,6 @@
                         </a:rPr>
                         <a:t>11/14/2018</a:t>
                       </a:r>
-                      <a:endParaRPr lang="es-VE" sz="1400" b="0" kern="1200" dirty="0" smtClean="0">
-                        <a:solidFill>
-                          <a:srgbClr val="00B050"/>
-                        </a:solidFill>
-                        <a:latin typeface="+mn-lt"/>
-                        <a:ea typeface="+mn-ea"/>
-                        <a:cs typeface="+mn-cs"/>
-                      </a:endParaRPr>
                     </a:p>
                   </a:txBody>
                   <a:tcPr/>
@@ -12524,6 +12839,11 @@
                   </a:txBody>
                   <a:tcPr/>
                 </a:tc>
+                <a:extLst>
+                  <a:ext uri="{0D108BD9-81ED-4DB2-BD59-A6C34878D82A}">
+                    <a16:rowId xmlns:a16="http://schemas.microsoft.com/office/drawing/2014/main" val="10001"/>
+                  </a:ext>
+                </a:extLst>
               </a:tr>
               <a:tr h="357190">
                 <a:tc>
@@ -12595,6 +12915,11 @@
                   </a:txBody>
                   <a:tcPr/>
                 </a:tc>
+                <a:extLst>
+                  <a:ext uri="{0D108BD9-81ED-4DB2-BD59-A6C34878D82A}">
+                    <a16:rowId xmlns:a16="http://schemas.microsoft.com/office/drawing/2014/main" val="10002"/>
+                  </a:ext>
+                </a:extLst>
               </a:tr>
             </a:tbl>
           </a:graphicData>
@@ -12684,14 +13009,14 @@
           <p:nvPr>
             <p:extLst>
               <p:ext uri="{D42A27DB-BD31-4B8C-83A1-F6EECF244321}">
-                <p14:modId xmlns:p14="http://schemas.microsoft.com/office/powerpoint/2010/main" val="540724980"/>
+                <p14:modId xmlns:p14="http://schemas.microsoft.com/office/powerpoint/2010/main" val="4211230849"/>
               </p:ext>
             </p:extLst>
           </p:nvPr>
         </p:nvGraphicFramePr>
         <p:xfrm>
           <a:off x="1676400" y="1892058"/>
-          <a:ext cx="8673634" cy="3584502"/>
+          <a:ext cx="8673634" cy="3574406"/>
         </p:xfrm>
         <a:graphic>
           <a:graphicData uri="http://schemas.openxmlformats.org/drawingml/2006/table">
@@ -12700,12 +13025,48 @@
                 <a:tableStyleId>{5C22544A-7EE6-4342-B048-85BDC9FD1C3A}</a:tableStyleId>
               </a:tblPr>
               <a:tblGrid>
-                <a:gridCol w="1911927"/>
-                <a:gridCol w="1052946"/>
-                <a:gridCol w="2860963"/>
-                <a:gridCol w="1094509"/>
-                <a:gridCol w="990600"/>
-                <a:gridCol w="762689"/>
+                <a:gridCol w="1911927">
+                  <a:extLst>
+                    <a:ext uri="{9D8B030D-6E8A-4147-A177-3AD203B41FA5}">
+                      <a16:colId xmlns:a16="http://schemas.microsoft.com/office/drawing/2014/main" val="20000"/>
+                    </a:ext>
+                  </a:extLst>
+                </a:gridCol>
+                <a:gridCol w="1052946">
+                  <a:extLst>
+                    <a:ext uri="{9D8B030D-6E8A-4147-A177-3AD203B41FA5}">
+                      <a16:colId xmlns:a16="http://schemas.microsoft.com/office/drawing/2014/main" val="20001"/>
+                    </a:ext>
+                  </a:extLst>
+                </a:gridCol>
+                <a:gridCol w="2860963">
+                  <a:extLst>
+                    <a:ext uri="{9D8B030D-6E8A-4147-A177-3AD203B41FA5}">
+                      <a16:colId xmlns:a16="http://schemas.microsoft.com/office/drawing/2014/main" val="20002"/>
+                    </a:ext>
+                  </a:extLst>
+                </a:gridCol>
+                <a:gridCol w="1094509">
+                  <a:extLst>
+                    <a:ext uri="{9D8B030D-6E8A-4147-A177-3AD203B41FA5}">
+                      <a16:colId xmlns:a16="http://schemas.microsoft.com/office/drawing/2014/main" val="20003"/>
+                    </a:ext>
+                  </a:extLst>
+                </a:gridCol>
+                <a:gridCol w="990600">
+                  <a:extLst>
+                    <a:ext uri="{9D8B030D-6E8A-4147-A177-3AD203B41FA5}">
+                      <a16:colId xmlns:a16="http://schemas.microsoft.com/office/drawing/2014/main" val="20004"/>
+                    </a:ext>
+                  </a:extLst>
+                </a:gridCol>
+                <a:gridCol w="762689">
+                  <a:extLst>
+                    <a:ext uri="{9D8B030D-6E8A-4147-A177-3AD203B41FA5}">
+                      <a16:colId xmlns:a16="http://schemas.microsoft.com/office/drawing/2014/main" val="20005"/>
+                    </a:ext>
+                  </a:extLst>
+                </a:gridCol>
               </a:tblGrid>
               <a:tr h="607302">
                 <a:tc>
@@ -12802,6 +13163,11 @@
                   </a:txBody>
                   <a:tcPr/>
                 </a:tc>
+                <a:extLst>
+                  <a:ext uri="{0D108BD9-81ED-4DB2-BD59-A6C34878D82A}">
+                    <a16:rowId xmlns:a16="http://schemas.microsoft.com/office/drawing/2014/main" val="10000"/>
+                  </a:ext>
+                </a:extLst>
               </a:tr>
               <a:tr h="357190">
                 <a:tc>
@@ -12873,14 +13239,6 @@
                         </a:rPr>
                         <a:t>7/13/2018</a:t>
                       </a:r>
-                      <a:endParaRPr lang="es-VE" sz="1400" kern="1200" baseline="0" dirty="0" smtClean="0">
-                        <a:solidFill>
-                          <a:srgbClr val="00B050"/>
-                        </a:solidFill>
-                        <a:latin typeface="+mn-lt"/>
-                        <a:ea typeface="+mn-ea"/>
-                        <a:cs typeface="+mn-cs"/>
-                      </a:endParaRPr>
                     </a:p>
                   </a:txBody>
                   <a:tcPr marL="68580" marR="68580" marT="0" marB="0"/>
@@ -12962,7 +13320,7 @@
                     <a:bodyPr/>
                     <a:lstStyle/>
                     <a:p>
-                      <a:pPr>
+                      <a:pPr algn="ctr">
                         <a:lnSpc>
                           <a:spcPct val="107000"/>
                         </a:lnSpc>
@@ -13018,6 +13376,11 @@
                   </a:txBody>
                   <a:tcPr marL="68580" marR="68580" marT="0" marB="0"/>
                 </a:tc>
+                <a:extLst>
+                  <a:ext uri="{0D108BD9-81ED-4DB2-BD59-A6C34878D82A}">
+                    <a16:rowId xmlns:a16="http://schemas.microsoft.com/office/drawing/2014/main" val="10001"/>
+                  </a:ext>
+                </a:extLst>
               </a:tr>
               <a:tr h="357190">
                 <a:tc>
@@ -13098,14 +13461,6 @@
                         </a:rPr>
                         <a:t>7/14/2018</a:t>
                       </a:r>
-                      <a:endParaRPr lang="es-VE" sz="1400" kern="1200" baseline="0" dirty="0" smtClean="0">
-                        <a:solidFill>
-                          <a:srgbClr val="00B050"/>
-                        </a:solidFill>
-                        <a:latin typeface="+mn-lt"/>
-                        <a:ea typeface="+mn-ea"/>
-                        <a:cs typeface="+mn-cs"/>
-                      </a:endParaRPr>
                     </a:p>
                   </a:txBody>
                   <a:tcPr marL="68580" marR="68580" marT="0" marB="0"/>
@@ -13172,14 +13527,6 @@
                         </a:rPr>
                         <a:t>NI</a:t>
                       </a:r>
-                      <a:endParaRPr lang="es-VE" sz="1400" kern="1200" dirty="0" smtClean="0">
-                        <a:solidFill>
-                          <a:srgbClr val="00B050"/>
-                        </a:solidFill>
-                        <a:latin typeface="+mn-lt"/>
-                        <a:ea typeface="+mn-ea"/>
-                        <a:cs typeface="+mn-cs"/>
-                      </a:endParaRPr>
                     </a:p>
                   </a:txBody>
                   <a:tcPr marL="68580" marR="68580" marT="0" marB="0"/>
@@ -13201,14 +13548,6 @@
                         </a:rPr>
                         <a:t>PM</a:t>
                       </a:r>
-                      <a:endParaRPr lang="es-VE" sz="1400" kern="1200" dirty="0" smtClean="0">
-                        <a:solidFill>
-                          <a:srgbClr val="00B050"/>
-                        </a:solidFill>
-                        <a:latin typeface="+mn-lt"/>
-                        <a:ea typeface="+mn-ea"/>
-                        <a:cs typeface="+mn-cs"/>
-                      </a:endParaRPr>
                     </a:p>
                   </a:txBody>
                   <a:tcPr marL="68580" marR="68580" marT="0" marB="0"/>
@@ -13247,6 +13586,11 @@
                   </a:txBody>
                   <a:tcPr marL="68580" marR="68580" marT="0" marB="0"/>
                 </a:tc>
+                <a:extLst>
+                  <a:ext uri="{0D108BD9-81ED-4DB2-BD59-A6C34878D82A}">
+                    <a16:rowId xmlns:a16="http://schemas.microsoft.com/office/drawing/2014/main" val="10002"/>
+                  </a:ext>
+                </a:extLst>
               </a:tr>
               <a:tr h="357190">
                 <a:tc>
@@ -13327,14 +13671,6 @@
                         </a:rPr>
                         <a:t>7/14/2018</a:t>
                       </a:r>
-                      <a:endParaRPr lang="es-VE" sz="1400" kern="1200" baseline="0" dirty="0" smtClean="0">
-                        <a:solidFill>
-                          <a:srgbClr val="00B050"/>
-                        </a:solidFill>
-                        <a:latin typeface="+mn-lt"/>
-                        <a:ea typeface="+mn-ea"/>
-                        <a:cs typeface="+mn-cs"/>
-                      </a:endParaRPr>
                     </a:p>
                   </a:txBody>
                   <a:tcPr marL="68580" marR="68580" marT="0" marB="0"/>
@@ -13401,14 +13737,6 @@
                         </a:rPr>
                         <a:t>NI</a:t>
                       </a:r>
-                      <a:endParaRPr lang="es-VE" sz="1400" kern="1200" dirty="0" smtClean="0">
-                        <a:solidFill>
-                          <a:srgbClr val="00B050"/>
-                        </a:solidFill>
-                        <a:latin typeface="+mn-lt"/>
-                        <a:ea typeface="+mn-ea"/>
-                        <a:cs typeface="+mn-cs"/>
-                      </a:endParaRPr>
                     </a:p>
                   </a:txBody>
                   <a:tcPr marL="68580" marR="68580" marT="0" marB="0"/>
@@ -13430,14 +13758,6 @@
                         </a:rPr>
                         <a:t>PM</a:t>
                       </a:r>
-                      <a:endParaRPr lang="es-VE" sz="1400" kern="1200" dirty="0" smtClean="0">
-                        <a:solidFill>
-                          <a:srgbClr val="00B050"/>
-                        </a:solidFill>
-                        <a:latin typeface="+mn-lt"/>
-                        <a:ea typeface="+mn-ea"/>
-                        <a:cs typeface="+mn-cs"/>
-                      </a:endParaRPr>
                     </a:p>
                   </a:txBody>
                   <a:tcPr marL="68580" marR="68580" marT="0" marB="0"/>
@@ -13476,6 +13796,11 @@
                   </a:txBody>
                   <a:tcPr marL="68580" marR="68580" marT="0" marB="0"/>
                 </a:tc>
+                <a:extLst>
+                  <a:ext uri="{0D108BD9-81ED-4DB2-BD59-A6C34878D82A}">
+                    <a16:rowId xmlns:a16="http://schemas.microsoft.com/office/drawing/2014/main" val="10003"/>
+                  </a:ext>
+                </a:extLst>
               </a:tr>
               <a:tr h="357190">
                 <a:tc>
@@ -13583,6 +13908,11 @@
                   </a:txBody>
                   <a:tcPr/>
                 </a:tc>
+                <a:extLst>
+                  <a:ext uri="{0D108BD9-81ED-4DB2-BD59-A6C34878D82A}">
+                    <a16:rowId xmlns:a16="http://schemas.microsoft.com/office/drawing/2014/main" val="10004"/>
+                  </a:ext>
+                </a:extLst>
               </a:tr>
             </a:tbl>
           </a:graphicData>
@@ -13753,7 +14083,7 @@
           <p:cNvPr id="2" name="Título 1">
             <a:extLst>
               <a:ext uri="{FF2B5EF4-FFF2-40B4-BE49-F238E27FC236}">
-                <a16:creationId xmlns:a16="http://schemas.microsoft.com/office/drawing/2014/main" xmlns="" id="{4C5CFB34-A80A-4251-97D8-E309BCCBF128}"/>
+                <a16:creationId xmlns:a16="http://schemas.microsoft.com/office/drawing/2014/main" id="{4C5CFB34-A80A-4251-97D8-E309BCCBF128}"/>
               </a:ext>
             </a:extLst>
           </p:cNvPr>
@@ -13815,11 +14145,41 @@
                 <a:tableStyleId>{5C22544A-7EE6-4342-B048-85BDC9FD1C3A}</a:tableStyleId>
               </a:tblPr>
               <a:tblGrid>
-                <a:gridCol w="1928826"/>
-                <a:gridCol w="1928826"/>
-                <a:gridCol w="1714512"/>
-                <a:gridCol w="1815586"/>
-                <a:gridCol w="1285884"/>
+                <a:gridCol w="1928826">
+                  <a:extLst>
+                    <a:ext uri="{9D8B030D-6E8A-4147-A177-3AD203B41FA5}">
+                      <a16:colId xmlns:a16="http://schemas.microsoft.com/office/drawing/2014/main" val="20000"/>
+                    </a:ext>
+                  </a:extLst>
+                </a:gridCol>
+                <a:gridCol w="1928826">
+                  <a:extLst>
+                    <a:ext uri="{9D8B030D-6E8A-4147-A177-3AD203B41FA5}">
+                      <a16:colId xmlns:a16="http://schemas.microsoft.com/office/drawing/2014/main" val="20001"/>
+                    </a:ext>
+                  </a:extLst>
+                </a:gridCol>
+                <a:gridCol w="1714512">
+                  <a:extLst>
+                    <a:ext uri="{9D8B030D-6E8A-4147-A177-3AD203B41FA5}">
+                      <a16:colId xmlns:a16="http://schemas.microsoft.com/office/drawing/2014/main" val="20002"/>
+                    </a:ext>
+                  </a:extLst>
+                </a:gridCol>
+                <a:gridCol w="1815586">
+                  <a:extLst>
+                    <a:ext uri="{9D8B030D-6E8A-4147-A177-3AD203B41FA5}">
+                      <a16:colId xmlns:a16="http://schemas.microsoft.com/office/drawing/2014/main" val="20003"/>
+                    </a:ext>
+                  </a:extLst>
+                </a:gridCol>
+                <a:gridCol w="1285884">
+                  <a:extLst>
+                    <a:ext uri="{9D8B030D-6E8A-4147-A177-3AD203B41FA5}">
+                      <a16:colId xmlns:a16="http://schemas.microsoft.com/office/drawing/2014/main" val="20004"/>
+                    </a:ext>
+                  </a:extLst>
+                </a:gridCol>
               </a:tblGrid>
               <a:tr h="357190">
                 <a:tc>
@@ -13901,6 +14261,11 @@
                   </a:txBody>
                   <a:tcPr/>
                 </a:tc>
+                <a:extLst>
+                  <a:ext uri="{0D108BD9-81ED-4DB2-BD59-A6C34878D82A}">
+                    <a16:rowId xmlns:a16="http://schemas.microsoft.com/office/drawing/2014/main" val="10000"/>
+                  </a:ext>
+                </a:extLst>
               </a:tr>
               <a:tr h="357190">
                 <a:tc>
@@ -14010,6 +14375,11 @@
                   </a:txBody>
                   <a:tcPr/>
                 </a:tc>
+                <a:extLst>
+                  <a:ext uri="{0D108BD9-81ED-4DB2-BD59-A6C34878D82A}">
+                    <a16:rowId xmlns:a16="http://schemas.microsoft.com/office/drawing/2014/main" val="10001"/>
+                  </a:ext>
+                </a:extLst>
               </a:tr>
               <a:tr h="357190">
                 <a:tc>
@@ -14099,6 +14469,11 @@
                   </a:txBody>
                   <a:tcPr/>
                 </a:tc>
+                <a:extLst>
+                  <a:ext uri="{0D108BD9-81ED-4DB2-BD59-A6C34878D82A}">
+                    <a16:rowId xmlns:a16="http://schemas.microsoft.com/office/drawing/2014/main" val="10002"/>
+                  </a:ext>
+                </a:extLst>
               </a:tr>
               <a:tr h="357190">
                 <a:tc>
@@ -14188,6 +14563,11 @@
                   </a:txBody>
                   <a:tcPr/>
                 </a:tc>
+                <a:extLst>
+                  <a:ext uri="{0D108BD9-81ED-4DB2-BD59-A6C34878D82A}">
+                    <a16:rowId xmlns:a16="http://schemas.microsoft.com/office/drawing/2014/main" val="10003"/>
+                  </a:ext>
+                </a:extLst>
               </a:tr>
               <a:tr h="357190">
                 <a:tc>
@@ -14277,6 +14657,11 @@
                   </a:txBody>
                   <a:tcPr/>
                 </a:tc>
+                <a:extLst>
+                  <a:ext uri="{0D108BD9-81ED-4DB2-BD59-A6C34878D82A}">
+                    <a16:rowId xmlns:a16="http://schemas.microsoft.com/office/drawing/2014/main" val="10004"/>
+                  </a:ext>
+                </a:extLst>
               </a:tr>
               <a:tr h="357190">
                 <a:tc>
@@ -14366,6 +14751,11 @@
                   </a:txBody>
                   <a:tcPr/>
                 </a:tc>
+                <a:extLst>
+                  <a:ext uri="{0D108BD9-81ED-4DB2-BD59-A6C34878D82A}">
+                    <a16:rowId xmlns:a16="http://schemas.microsoft.com/office/drawing/2014/main" val="10005"/>
+                  </a:ext>
+                </a:extLst>
               </a:tr>
             </a:tbl>
           </a:graphicData>

</xml_diff>